<commit_message>
added comments in setBadChannsManual and setBadComponents
</commit_message>
<xml_diff>
--- a/Analysis/Analysis Pipeline.pptx
+++ b/Analysis/Analysis Pipeline.pptx
@@ -197,7 +197,7 @@
           <a:p>
             <a:fld id="{3CEB35BA-0CFF-C148-8A18-CE00B4826AB3}" type="datetimeFigureOut">
               <a:rPr lang="en-GB" smtClean="0"/>
-              <a:t>08/05/2017</a:t>
+              <a:t>09/05/2017</a:t>
             </a:fld>
             <a:endParaRPr lang="en-GB"/>
           </a:p>
@@ -691,7 +691,7 @@
           <a:p>
             <a:fld id="{8B781B04-3F76-B948-8FDA-A204D83FD6C6}" type="datetimeFigureOut">
               <a:rPr lang="en-GB" smtClean="0"/>
-              <a:t>08/05/2017</a:t>
+              <a:t>09/05/2017</a:t>
             </a:fld>
             <a:endParaRPr lang="en-GB"/>
           </a:p>
@@ -861,7 +861,7 @@
           <a:p>
             <a:fld id="{8B781B04-3F76-B948-8FDA-A204D83FD6C6}" type="datetimeFigureOut">
               <a:rPr lang="en-GB" smtClean="0"/>
-              <a:t>08/05/2017</a:t>
+              <a:t>09/05/2017</a:t>
             </a:fld>
             <a:endParaRPr lang="en-GB"/>
           </a:p>
@@ -1041,7 +1041,7 @@
           <a:p>
             <a:fld id="{8B781B04-3F76-B948-8FDA-A204D83FD6C6}" type="datetimeFigureOut">
               <a:rPr lang="en-GB" smtClean="0"/>
-              <a:t>08/05/2017</a:t>
+              <a:t>09/05/2017</a:t>
             </a:fld>
             <a:endParaRPr lang="en-GB"/>
           </a:p>
@@ -1211,7 +1211,7 @@
           <a:p>
             <a:fld id="{8B781B04-3F76-B948-8FDA-A204D83FD6C6}" type="datetimeFigureOut">
               <a:rPr lang="en-GB" smtClean="0"/>
-              <a:t>08/05/2017</a:t>
+              <a:t>09/05/2017</a:t>
             </a:fld>
             <a:endParaRPr lang="en-GB"/>
           </a:p>
@@ -1457,7 +1457,7 @@
           <a:p>
             <a:fld id="{8B781B04-3F76-B948-8FDA-A204D83FD6C6}" type="datetimeFigureOut">
               <a:rPr lang="en-GB" smtClean="0"/>
-              <a:t>08/05/2017</a:t>
+              <a:t>09/05/2017</a:t>
             </a:fld>
             <a:endParaRPr lang="en-GB"/>
           </a:p>
@@ -1695,7 +1695,7 @@
           <a:p>
             <a:fld id="{8B781B04-3F76-B948-8FDA-A204D83FD6C6}" type="datetimeFigureOut">
               <a:rPr lang="en-GB" smtClean="0"/>
-              <a:t>08/05/2017</a:t>
+              <a:t>09/05/2017</a:t>
             </a:fld>
             <a:endParaRPr lang="en-GB"/>
           </a:p>
@@ -2062,7 +2062,7 @@
           <a:p>
             <a:fld id="{8B781B04-3F76-B948-8FDA-A204D83FD6C6}" type="datetimeFigureOut">
               <a:rPr lang="en-GB" smtClean="0"/>
-              <a:t>08/05/2017</a:t>
+              <a:t>09/05/2017</a:t>
             </a:fld>
             <a:endParaRPr lang="en-GB"/>
           </a:p>
@@ -2191,7 +2191,7 @@
           <a:p>
             <a:fld id="{8B781B04-3F76-B948-8FDA-A204D83FD6C6}" type="datetimeFigureOut">
               <a:rPr lang="en-GB" smtClean="0"/>
-              <a:t>08/05/2017</a:t>
+              <a:t>09/05/2017</a:t>
             </a:fld>
             <a:endParaRPr lang="en-GB"/>
           </a:p>
@@ -2286,7 +2286,7 @@
           <a:p>
             <a:fld id="{8B781B04-3F76-B948-8FDA-A204D83FD6C6}" type="datetimeFigureOut">
               <a:rPr lang="en-GB" smtClean="0"/>
-              <a:t>08/05/2017</a:t>
+              <a:t>09/05/2017</a:t>
             </a:fld>
             <a:endParaRPr lang="en-GB"/>
           </a:p>
@@ -2563,7 +2563,7 @@
           <a:p>
             <a:fld id="{8B781B04-3F76-B948-8FDA-A204D83FD6C6}" type="datetimeFigureOut">
               <a:rPr lang="en-GB" smtClean="0"/>
-              <a:t>08/05/2017</a:t>
+              <a:t>09/05/2017</a:t>
             </a:fld>
             <a:endParaRPr lang="en-GB"/>
           </a:p>
@@ -2820,7 +2820,7 @@
           <a:p>
             <a:fld id="{8B781B04-3F76-B948-8FDA-A204D83FD6C6}" type="datetimeFigureOut">
               <a:rPr lang="en-GB" smtClean="0"/>
-              <a:t>08/05/2017</a:t>
+              <a:t>09/05/2017</a:t>
             </a:fld>
             <a:endParaRPr lang="en-GB"/>
           </a:p>
@@ -3033,7 +3033,7 @@
           <a:p>
             <a:fld id="{8B781B04-3F76-B948-8FDA-A204D83FD6C6}" type="datetimeFigureOut">
               <a:rPr lang="en-GB" smtClean="0"/>
-              <a:t>08/05/2017</a:t>
+              <a:t>09/05/2017</a:t>
             </a:fld>
             <a:endParaRPr lang="en-GB"/>
           </a:p>
@@ -3450,7 +3450,7 @@
         </p:nvSpPr>
         <p:spPr>
           <a:xfrm>
-            <a:off x="652966" y="48665"/>
+            <a:off x="623392" y="48665"/>
             <a:ext cx="7886700" cy="678228"/>
           </a:xfrm>
         </p:spPr>
@@ -3536,13 +3536,8 @@
             </a:pPr>
             <a:r>
               <a:rPr lang="en-GB" sz="1200" dirty="0"/>
-              <a:t>define </a:t>
-            </a:r>
-            <a:r>
-              <a:rPr lang="en-GB" sz="1200" dirty="0"/>
-              <a:t>trial &amp; epoch [-1 4]</a:t>
-            </a:r>
-            <a:endParaRPr lang="en-GB" sz="1200" dirty="0"/>
+              <a:t>define trial &amp; epoch [-1 4]</a:t>
+            </a:r>
           </a:p>
           <a:p>
             <a:pPr marL="342900" indent="-342900">
@@ -3553,7 +3548,6 @@
               <a:rPr lang="en-GB" sz="1200" dirty="0"/>
               <a:t>LP 100Hz for anti-aliasing</a:t>
             </a:r>
-            <a:endParaRPr lang="en-GB" sz="1200" dirty="0"/>
           </a:p>
           <a:p>
             <a:pPr marL="342900" indent="-342900">
@@ -3566,11 +3560,7 @@
             </a:r>
             <a:r>
               <a:rPr lang="en-GB" sz="1200" dirty="0"/>
-              <a:t> </a:t>
-            </a:r>
-            <a:r>
-              <a:rPr lang="en-GB" sz="1200" dirty="0"/>
-              <a:t>200Hz</a:t>
+              <a:t> 200Hz</a:t>
             </a:r>
           </a:p>
           <a:p>
@@ -3656,15 +3646,7 @@
             </a:pPr>
             <a:r>
               <a:rPr lang="en-GB" sz="1200" dirty="0"/>
-              <a:t>visual </a:t>
-            </a:r>
-            <a:r>
-              <a:rPr lang="en-GB" sz="1200" dirty="0"/>
-              <a:t>outliers – trials and </a:t>
-            </a:r>
-            <a:r>
-              <a:rPr lang="en-GB" sz="1200" dirty="0"/>
-              <a:t>channels</a:t>
+              <a:t>visual outliers – trials and channels</a:t>
             </a:r>
           </a:p>
           <a:p>
@@ -3943,13 +3925,8 @@
             </a:pPr>
             <a:r>
               <a:rPr lang="en-GB" sz="1200" dirty="0"/>
-              <a:t>define </a:t>
-            </a:r>
-            <a:r>
-              <a:rPr lang="en-GB" sz="1200" dirty="0"/>
-              <a:t>trial &amp; epoch</a:t>
-            </a:r>
-            <a:endParaRPr lang="en-GB" sz="1200" dirty="0"/>
+              <a:t>define trial &amp; epoch</a:t>
+            </a:r>
           </a:p>
           <a:p>
             <a:pPr marL="342900" indent="-342900">
@@ -3960,7 +3937,6 @@
               <a:rPr lang="en-GB" sz="1200" dirty="0"/>
               <a:t>LP 100Hz</a:t>
             </a:r>
-            <a:endParaRPr lang="en-GB" sz="1200" dirty="0"/>
           </a:p>
           <a:p>
             <a:pPr marL="342900" indent="-342900">
@@ -3973,11 +3949,7 @@
             </a:r>
             <a:r>
               <a:rPr lang="en-GB" sz="1200" dirty="0"/>
-              <a:t> </a:t>
-            </a:r>
-            <a:r>
-              <a:rPr lang="en-GB" sz="1200" dirty="0"/>
-              <a:t>200Hz</a:t>
+              <a:t> 200Hz</a:t>
             </a:r>
           </a:p>
           <a:p>
@@ -4152,11 +4124,6 @@
               </a:rPr>
               <a:t> matrix</a:t>
             </a:r>
-            <a:endParaRPr lang="en-GB" sz="1200" i="1" dirty="0">
-              <a:solidFill>
-                <a:srgbClr val="00E584"/>
-              </a:solidFill>
-            </a:endParaRPr>
           </a:p>
         </p:txBody>
       </p:sp>
@@ -4573,11 +4540,7 @@
             </a:pPr>
             <a:r>
               <a:rPr lang="en-GB" sz="1200" dirty="0"/>
-              <a:t>define </a:t>
-            </a:r>
-            <a:r>
-              <a:rPr lang="en-GB" sz="1200" dirty="0"/>
-              <a:t>trial &amp; epoch: </a:t>
+              <a:t>define trial &amp; epoch: </a:t>
             </a:r>
             <a:r>
               <a:rPr lang="en-GB" sz="1200" dirty="0" err="1"/>
@@ -4585,19 +4548,7 @@
             </a:r>
             <a:r>
               <a:rPr lang="en-GB" sz="1200" dirty="0"/>
-              <a:t> to deviant </a:t>
-            </a:r>
-            <a:r>
-              <a:rPr lang="en-GB" sz="1200" dirty="0"/>
-              <a:t>[-</a:t>
-            </a:r>
-            <a:r>
-              <a:rPr lang="en-GB" sz="1200" dirty="0"/>
-              <a:t>1</a:t>
-            </a:r>
-            <a:r>
-              <a:rPr lang="en-GB" sz="1200" dirty="0"/>
-              <a:t> 1] with 2.1s </a:t>
+              <a:t> to deviant [-1 1] with 2.1s </a:t>
             </a:r>
             <a:r>
               <a:rPr lang="en-GB" sz="1200" dirty="0" err="1"/>
@@ -4607,7 +4558,6 @@
               <a:rPr lang="en-GB" sz="1200" dirty="0"/>
               <a:t> for REG &amp; RAND</a:t>
             </a:r>
-            <a:endParaRPr lang="en-GB" sz="1200" dirty="0"/>
           </a:p>
           <a:p>
             <a:pPr marL="342900" indent="-342900">

</xml_diff>